<commit_message>
fuguras + atualizações gerais
</commit_message>
<xml_diff>
--- a/Projeto de PO-233.pptx
+++ b/Projeto de PO-233.pptx
@@ -5,10 +5,10 @@
     <p:sldMasterId id="2147483660" r:id="rId4"/>
   </p:sldMasterIdLst>
   <p:notesMasterIdLst>
-    <p:notesMasterId r:id="rId12"/>
+    <p:notesMasterId r:id="rId14"/>
   </p:notesMasterIdLst>
   <p:handoutMasterIdLst>
-    <p:handoutMasterId r:id="rId13"/>
+    <p:handoutMasterId r:id="rId15"/>
   </p:handoutMasterIdLst>
   <p:sldIdLst>
     <p:sldId id="302" r:id="rId5"/>
@@ -18,6 +18,8 @@
     <p:sldId id="306" r:id="rId9"/>
     <p:sldId id="308" r:id="rId10"/>
     <p:sldId id="307" r:id="rId11"/>
+    <p:sldId id="309" r:id="rId12"/>
+    <p:sldId id="311" r:id="rId13"/>
   </p:sldIdLst>
   <p:sldSz cx="12192000" cy="6858000"/>
   <p:notesSz cx="6858000" cy="9144000"/>
@@ -209,7 +211,7 @@
           <a:p>
             <a:fld id="{6212CF2B-E82F-4152-ADD2-ED47E5A676F4}" type="datetimeFigureOut">
               <a:rPr lang="pt-BR" smtClean="0"/>
-              <a:t>12/06/2022</a:t>
+              <a:t>18/06/2022</a:t>
             </a:fld>
             <a:endParaRPr lang="pt-BR" dirty="0"/>
           </a:p>
@@ -374,7 +376,7 @@
           <a:p>
             <a:fld id="{94F9FF0D-B331-4276-BF84-39B369306F99}" type="datetimeFigureOut">
               <a:rPr lang="pt-BR" noProof="0" smtClean="0"/>
-              <a:t>12/06/2022</a:t>
+              <a:t>18/06/2022</a:t>
             </a:fld>
             <a:endParaRPr lang="pt-BR" noProof="0" dirty="0"/>
           </a:p>
@@ -1140,7 +1142,7 @@
             <a:pPr rtl="0"/>
             <a:fld id="{604E8571-58AC-4B02-A72C-B7E3E60A7BA5}" type="datetime1">
               <a:rPr lang="pt-BR" noProof="0" smtClean="0"/>
-              <a:t>12/06/2022</a:t>
+              <a:t>18/06/2022</a:t>
             </a:fld>
             <a:endParaRPr lang="pt-BR" noProof="0" dirty="0"/>
           </a:p>
@@ -1332,7 +1334,7 @@
             <a:pPr rtl="0"/>
             <a:fld id="{46C2D5DC-E9E6-4460-9005-9561D7AE5062}" type="datetime1">
               <a:rPr lang="pt-BR" noProof="0" smtClean="0"/>
-              <a:t>12/06/2022</a:t>
+              <a:t>18/06/2022</a:t>
             </a:fld>
             <a:endParaRPr lang="pt-BR" noProof="0" dirty="0"/>
           </a:p>
@@ -1709,7 +1711,7 @@
             <a:pPr rtl="0"/>
             <a:fld id="{97616C38-4A2F-4C3B-B502-7E51C7F0342F}" type="datetime1">
               <a:rPr lang="pt-BR" noProof="0" smtClean="0"/>
-              <a:t>12/06/2022</a:t>
+              <a:t>18/06/2022</a:t>
             </a:fld>
             <a:endParaRPr lang="pt-BR" noProof="0" dirty="0"/>
           </a:p>
@@ -1968,7 +1970,7 @@
             <a:pPr rtl="0"/>
             <a:fld id="{20EB7CE7-B188-4FE4-8B6E-3889DBBDC355}" type="datetime1">
               <a:rPr lang="pt-BR" noProof="0" smtClean="0"/>
-              <a:t>12/06/2022</a:t>
+              <a:t>18/06/2022</a:t>
             </a:fld>
             <a:endParaRPr lang="pt-BR" noProof="0" dirty="0"/>
           </a:p>
@@ -2369,7 +2371,7 @@
             <a:pPr rtl="0"/>
             <a:fld id="{93932F7F-8399-49FC-B033-AD7A4B77F998}" type="datetime1">
               <a:rPr lang="pt-BR" noProof="0" smtClean="0"/>
-              <a:t>12/06/2022</a:t>
+              <a:t>18/06/2022</a:t>
             </a:fld>
             <a:endParaRPr lang="pt-BR" noProof="0" dirty="0"/>
           </a:p>
@@ -2509,7 +2511,7 @@
             <a:pPr rtl="0"/>
             <a:fld id="{80506B10-4878-49BC-96DE-C536CADA3095}" type="datetime1">
               <a:rPr lang="pt-BR" noProof="0" smtClean="0"/>
-              <a:t>12/06/2022</a:t>
+              <a:t>18/06/2022</a:t>
             </a:fld>
             <a:endParaRPr lang="pt-BR" noProof="0" dirty="0"/>
           </a:p>
@@ -2669,7 +2671,7 @@
             <a:pPr rtl="0"/>
             <a:fld id="{EF0B6ED2-E191-4517-BA6B-37A4CEFA3A0D}" type="datetime1">
               <a:rPr lang="pt-BR" noProof="0" smtClean="0"/>
-              <a:t>12/06/2022</a:t>
+              <a:t>18/06/2022</a:t>
             </a:fld>
             <a:endParaRPr lang="pt-BR" noProof="0" dirty="0"/>
           </a:p>
@@ -3002,7 +3004,7 @@
             <a:pPr rtl="0"/>
             <a:fld id="{BDB650E8-F74D-4BD3-A6BC-1B4D756C4BE8}" type="datetime1">
               <a:rPr lang="pt-BR" noProof="0" smtClean="0"/>
-              <a:t>12/06/2022</a:t>
+              <a:t>18/06/2022</a:t>
             </a:fld>
             <a:endParaRPr lang="pt-BR" noProof="0" dirty="0"/>
           </a:p>
@@ -3357,7 +3359,7 @@
             <a:pPr rtl="0"/>
             <a:fld id="{0B56C06F-C179-4D6D-A0AC-A9C8705BD208}" type="datetime1">
               <a:rPr lang="pt-BR" noProof="0" smtClean="0"/>
-              <a:t>12/06/2022</a:t>
+              <a:t>18/06/2022</a:t>
             </a:fld>
             <a:endParaRPr lang="pt-BR" noProof="0" dirty="0"/>
           </a:p>
@@ -3619,7 +3621,7 @@
             <a:pPr rtl="0"/>
             <a:fld id="{72B881A2-478D-4079-BD8F-044C479AA962}" type="datetime1">
               <a:rPr lang="pt-BR" noProof="0" smtClean="0"/>
-              <a:t>12/06/2022</a:t>
+              <a:t>18/06/2022</a:t>
             </a:fld>
             <a:endParaRPr lang="pt-BR" noProof="0" dirty="0"/>
           </a:p>
@@ -9112,21 +9114,6 @@
               </a:lnSpc>
             </a:pPr>
             <a:r>
-              <a:rPr lang="en-US" sz="1800" dirty="0">
-                <a:solidFill>
-                  <a:schemeClr val="tx1"/>
-                </a:solidFill>
-              </a:rPr>
-              <a:t>Feature Engineering</a:t>
-            </a:r>
-          </a:p>
-          <a:p>
-            <a:pPr algn="l">
-              <a:lnSpc>
-                <a:spcPct val="200000"/>
-              </a:lnSpc>
-            </a:pPr>
-            <a:r>
               <a:rPr lang="en-US" sz="1800" dirty="0" err="1">
                 <a:solidFill>
                   <a:schemeClr val="tx1"/>
@@ -9542,21 +9529,6 @@
                 </a:solidFill>
               </a:rPr>
               <a:t>6.</a:t>
-            </a:r>
-          </a:p>
-          <a:p>
-            <a:pPr>
-              <a:lnSpc>
-                <a:spcPct val="200000"/>
-              </a:lnSpc>
-            </a:pPr>
-            <a:r>
-              <a:rPr lang="en-US" sz="1800" dirty="0">
-                <a:solidFill>
-                  <a:schemeClr val="accent3"/>
-                </a:solidFill>
-              </a:rPr>
-              <a:t>7.</a:t>
             </a:r>
             <a:endParaRPr lang="en-US" sz="1600" dirty="0">
               <a:solidFill>
@@ -12475,6 +12447,696 @@
     <p:extLst>
       <p:ext uri="{BB962C8B-B14F-4D97-AF65-F5344CB8AC3E}">
         <p14:creationId xmlns:p14="http://schemas.microsoft.com/office/powerpoint/2010/main" val="1243396714"/>
+      </p:ext>
+    </p:extLst>
+  </p:cSld>
+  <p:clrMapOvr>
+    <a:masterClrMapping/>
+  </p:clrMapOvr>
+</p:sld>
+</file>
+
+<file path=ppt/slides/slide8.xml><?xml version="1.0" encoding="utf-8"?>
+<p:sld xmlns:a="http://schemas.openxmlformats.org/drawingml/2006/main" xmlns:r="http://schemas.openxmlformats.org/officeDocument/2006/relationships" xmlns:p="http://schemas.openxmlformats.org/presentationml/2006/main">
+  <p:cSld>
+    <p:spTree>
+      <p:nvGrpSpPr>
+        <p:cNvPr id="1" name=""/>
+        <p:cNvGrpSpPr/>
+        <p:nvPr/>
+      </p:nvGrpSpPr>
+      <p:grpSpPr>
+        <a:xfrm>
+          <a:off x="0" y="0"/>
+          <a:ext cx="0" cy="0"/>
+          <a:chOff x="0" y="0"/>
+          <a:chExt cx="0" cy="0"/>
+        </a:xfrm>
+      </p:grpSpPr>
+      <p:sp>
+        <p:nvSpPr>
+          <p:cNvPr id="2" name="Espaço Reservado para Texto 1">
+            <a:extLst>
+              <a:ext uri="{FF2B5EF4-FFF2-40B4-BE49-F238E27FC236}">
+                <a16:creationId xmlns:a16="http://schemas.microsoft.com/office/drawing/2014/main" id="{2735EEA7-6508-3C41-1176-C7012D716092}"/>
+              </a:ext>
+            </a:extLst>
+          </p:cNvPr>
+          <p:cNvSpPr txBox="1">
+            <a:spLocks/>
+          </p:cNvSpPr>
+          <p:nvPr/>
+        </p:nvSpPr>
+        <p:spPr>
+          <a:xfrm>
+            <a:off x="542866" y="340389"/>
+            <a:ext cx="6195285" cy="721222"/>
+          </a:xfrm>
+          <a:prstGeom prst="rect">
+            <a:avLst/>
+          </a:prstGeom>
+        </p:spPr>
+        <p:txBody>
+          <a:bodyPr vert="horz" lIns="91440" tIns="45720" rIns="91440" bIns="45720" rtlCol="0" anchor="ctr"/>
+          <a:lstStyle>
+            <a:defPPr rtl="0">
+              <a:defRPr lang="pt-br"/>
+            </a:defPPr>
+            <a:lvl1pPr marL="0" algn="l" defTabSz="914400" rtl="0" eaLnBrk="1" latinLnBrk="0" hangingPunct="1">
+              <a:defRPr sz="800" kern="1200">
+                <a:solidFill>
+                  <a:srgbClr val="FFFFFF"/>
+                </a:solidFill>
+                <a:latin typeface="+mn-lt"/>
+                <a:ea typeface="+mn-ea"/>
+                <a:cs typeface="+mn-cs"/>
+              </a:defRPr>
+            </a:lvl1pPr>
+            <a:lvl2pPr marL="457200" algn="l" defTabSz="914400" rtl="0" eaLnBrk="1" latinLnBrk="0" hangingPunct="1">
+              <a:defRPr sz="1800" kern="1200">
+                <a:solidFill>
+                  <a:schemeClr val="tx1"/>
+                </a:solidFill>
+                <a:latin typeface="+mn-lt"/>
+                <a:ea typeface="+mn-ea"/>
+                <a:cs typeface="+mn-cs"/>
+              </a:defRPr>
+            </a:lvl2pPr>
+            <a:lvl3pPr marL="914400" algn="l" defTabSz="914400" rtl="0" eaLnBrk="1" latinLnBrk="0" hangingPunct="1">
+              <a:defRPr sz="1800" kern="1200">
+                <a:solidFill>
+                  <a:schemeClr val="tx1"/>
+                </a:solidFill>
+                <a:latin typeface="+mn-lt"/>
+                <a:ea typeface="+mn-ea"/>
+                <a:cs typeface="+mn-cs"/>
+              </a:defRPr>
+            </a:lvl3pPr>
+            <a:lvl4pPr marL="1371600" algn="l" defTabSz="914400" rtl="0" eaLnBrk="1" latinLnBrk="0" hangingPunct="1">
+              <a:defRPr sz="1800" kern="1200">
+                <a:solidFill>
+                  <a:schemeClr val="tx1"/>
+                </a:solidFill>
+                <a:latin typeface="+mn-lt"/>
+                <a:ea typeface="+mn-ea"/>
+                <a:cs typeface="+mn-cs"/>
+              </a:defRPr>
+            </a:lvl4pPr>
+            <a:lvl5pPr marL="1828800" algn="l" defTabSz="914400" rtl="0" eaLnBrk="1" latinLnBrk="0" hangingPunct="1">
+              <a:defRPr sz="1800" kern="1200">
+                <a:solidFill>
+                  <a:schemeClr val="tx1"/>
+                </a:solidFill>
+                <a:latin typeface="+mn-lt"/>
+                <a:ea typeface="+mn-ea"/>
+                <a:cs typeface="+mn-cs"/>
+              </a:defRPr>
+            </a:lvl5pPr>
+            <a:lvl6pPr marL="2286000" algn="l" defTabSz="914400" rtl="0" eaLnBrk="1" latinLnBrk="0" hangingPunct="1">
+              <a:defRPr sz="1800" kern="1200">
+                <a:solidFill>
+                  <a:schemeClr val="tx1"/>
+                </a:solidFill>
+                <a:latin typeface="+mn-lt"/>
+                <a:ea typeface="+mn-ea"/>
+                <a:cs typeface="+mn-cs"/>
+              </a:defRPr>
+            </a:lvl6pPr>
+            <a:lvl7pPr marL="2743200" algn="l" defTabSz="914400" rtl="0" eaLnBrk="1" latinLnBrk="0" hangingPunct="1">
+              <a:defRPr sz="1800" kern="1200">
+                <a:solidFill>
+                  <a:schemeClr val="tx1"/>
+                </a:solidFill>
+                <a:latin typeface="+mn-lt"/>
+                <a:ea typeface="+mn-ea"/>
+                <a:cs typeface="+mn-cs"/>
+              </a:defRPr>
+            </a:lvl7pPr>
+            <a:lvl8pPr marL="3200400" algn="l" defTabSz="914400" rtl="0" eaLnBrk="1" latinLnBrk="0" hangingPunct="1">
+              <a:defRPr sz="1800" kern="1200">
+                <a:solidFill>
+                  <a:schemeClr val="tx1"/>
+                </a:solidFill>
+                <a:latin typeface="+mn-lt"/>
+                <a:ea typeface="+mn-ea"/>
+                <a:cs typeface="+mn-cs"/>
+              </a:defRPr>
+            </a:lvl8pPr>
+            <a:lvl9pPr marL="3657600" algn="l" defTabSz="914400" rtl="0" eaLnBrk="1" latinLnBrk="0" hangingPunct="1">
+              <a:defRPr sz="1800" kern="1200">
+                <a:solidFill>
+                  <a:schemeClr val="tx1"/>
+                </a:solidFill>
+                <a:latin typeface="+mn-lt"/>
+                <a:ea typeface="+mn-ea"/>
+                <a:cs typeface="+mn-cs"/>
+              </a:defRPr>
+            </a:lvl9pPr>
+          </a:lstStyle>
+          <a:p>
+            <a:endParaRPr lang="en-US" sz="4700" spc="-50" dirty="0">
+              <a:solidFill>
+                <a:schemeClr val="tx1">
+                  <a:lumMod val="75000"/>
+                  <a:lumOff val="25000"/>
+                </a:schemeClr>
+              </a:solidFill>
+              <a:latin typeface="+mj-lt"/>
+              <a:ea typeface="+mj-ea"/>
+              <a:cs typeface="+mj-cs"/>
+            </a:endParaRPr>
+          </a:p>
+        </p:txBody>
+      </p:sp>
+      <p:sp>
+        <p:nvSpPr>
+          <p:cNvPr id="5" name="Título 1">
+            <a:extLst>
+              <a:ext uri="{FF2B5EF4-FFF2-40B4-BE49-F238E27FC236}">
+                <a16:creationId xmlns:a16="http://schemas.microsoft.com/office/drawing/2014/main" id="{9BA25DD3-8952-F6D4-2708-391E2D8E8720}"/>
+              </a:ext>
+            </a:extLst>
+          </p:cNvPr>
+          <p:cNvSpPr txBox="1">
+            <a:spLocks/>
+          </p:cNvSpPr>
+          <p:nvPr/>
+        </p:nvSpPr>
+        <p:spPr>
+          <a:xfrm>
+            <a:off x="411271" y="292197"/>
+            <a:ext cx="6172064" cy="968375"/>
+          </a:xfrm>
+          <a:prstGeom prst="rect">
+            <a:avLst/>
+          </a:prstGeom>
+        </p:spPr>
+        <p:txBody>
+          <a:bodyPr/>
+          <a:lstStyle>
+            <a:lvl1pPr algn="l" defTabSz="914400" rtl="0" eaLnBrk="1" latinLnBrk="0" hangingPunct="1">
+              <a:lnSpc>
+                <a:spcPct val="90000"/>
+              </a:lnSpc>
+              <a:spcBef>
+                <a:spcPct val="0"/>
+              </a:spcBef>
+              <a:buNone/>
+              <a:defRPr sz="4700" i="0" kern="1200" spc="-50" baseline="0">
+                <a:solidFill>
+                  <a:schemeClr val="tx1">
+                    <a:lumMod val="75000"/>
+                    <a:lumOff val="25000"/>
+                  </a:schemeClr>
+                </a:solidFill>
+                <a:latin typeface="+mj-lt"/>
+                <a:ea typeface="+mj-ea"/>
+                <a:cs typeface="+mj-cs"/>
+              </a:defRPr>
+            </a:lvl1pPr>
+          </a:lstStyle>
+          <a:p>
+            <a:r>
+              <a:rPr lang="en-US" sz="4700" spc="-50" dirty="0" err="1">
+                <a:solidFill>
+                  <a:schemeClr val="tx1">
+                    <a:lumMod val="75000"/>
+                    <a:lumOff val="25000"/>
+                  </a:schemeClr>
+                </a:solidFill>
+                <a:latin typeface="+mj-lt"/>
+                <a:ea typeface="+mj-ea"/>
+                <a:cs typeface="+mj-cs"/>
+              </a:rPr>
+              <a:t>Análise</a:t>
+            </a:r>
+            <a:r>
+              <a:rPr lang="en-US" sz="4700" spc="-50" dirty="0">
+                <a:solidFill>
+                  <a:schemeClr val="tx1">
+                    <a:lumMod val="75000"/>
+                    <a:lumOff val="25000"/>
+                  </a:schemeClr>
+                </a:solidFill>
+                <a:latin typeface="+mj-lt"/>
+                <a:ea typeface="+mj-ea"/>
+                <a:cs typeface="+mj-cs"/>
+              </a:rPr>
+              <a:t> </a:t>
+            </a:r>
+            <a:r>
+              <a:rPr lang="en-US" sz="4700" spc="-50" dirty="0" err="1">
+                <a:solidFill>
+                  <a:schemeClr val="tx1">
+                    <a:lumMod val="75000"/>
+                    <a:lumOff val="25000"/>
+                  </a:schemeClr>
+                </a:solidFill>
+                <a:latin typeface="+mj-lt"/>
+                <a:ea typeface="+mj-ea"/>
+                <a:cs typeface="+mj-cs"/>
+              </a:rPr>
+              <a:t>Exploratória</a:t>
+            </a:r>
+            <a:endParaRPr lang="en-US" sz="4700" spc="-50" dirty="0">
+              <a:solidFill>
+                <a:schemeClr val="tx1">
+                  <a:lumMod val="75000"/>
+                  <a:lumOff val="25000"/>
+                </a:schemeClr>
+              </a:solidFill>
+              <a:latin typeface="+mj-lt"/>
+              <a:ea typeface="+mj-ea"/>
+              <a:cs typeface="+mj-cs"/>
+            </a:endParaRPr>
+          </a:p>
+        </p:txBody>
+      </p:sp>
+      <p:pic>
+        <p:nvPicPr>
+          <p:cNvPr id="4" name="Imagem 3" descr="Uma imagem contendo Gráfico&#10;&#10;Descrição gerada automaticamente">
+            <a:extLst>
+              <a:ext uri="{FF2B5EF4-FFF2-40B4-BE49-F238E27FC236}">
+                <a16:creationId xmlns:a16="http://schemas.microsoft.com/office/drawing/2014/main" id="{22CA72A5-5F5E-38CD-C217-FAEA72930EFA}"/>
+              </a:ext>
+            </a:extLst>
+          </p:cNvPr>
+          <p:cNvPicPr>
+            <a:picLocks noChangeAspect="1"/>
+          </p:cNvPicPr>
+          <p:nvPr/>
+        </p:nvPicPr>
+        <p:blipFill>
+          <a:blip r:embed="rId2"/>
+          <a:stretch>
+            <a:fillRect/>
+          </a:stretch>
+        </p:blipFill>
+        <p:spPr>
+          <a:xfrm>
+            <a:off x="3522763" y="1726014"/>
+            <a:ext cx="5146474" cy="4397896"/>
+          </a:xfrm>
+          <a:prstGeom prst="rect">
+            <a:avLst/>
+          </a:prstGeom>
+        </p:spPr>
+      </p:pic>
+      <p:sp>
+        <p:nvSpPr>
+          <p:cNvPr id="6" name="CaixaDeTexto 5">
+            <a:extLst>
+              <a:ext uri="{FF2B5EF4-FFF2-40B4-BE49-F238E27FC236}">
+                <a16:creationId xmlns:a16="http://schemas.microsoft.com/office/drawing/2014/main" id="{D2738E02-8EC1-F32D-B04E-FE7481960072}"/>
+              </a:ext>
+            </a:extLst>
+          </p:cNvPr>
+          <p:cNvSpPr txBox="1"/>
+          <p:nvPr/>
+        </p:nvSpPr>
+        <p:spPr>
+          <a:xfrm>
+            <a:off x="542866" y="1109803"/>
+            <a:ext cx="7207340" cy="338554"/>
+          </a:xfrm>
+          <a:prstGeom prst="rect">
+            <a:avLst/>
+          </a:prstGeom>
+          <a:noFill/>
+        </p:spPr>
+        <p:txBody>
+          <a:bodyPr wrap="square" rtlCol="0">
+            <a:spAutoFit/>
+          </a:bodyPr>
+          <a:lstStyle/>
+          <a:p>
+            <a:pPr marL="285750" indent="-285750">
+              <a:buFont typeface="Arial" panose="020B0604020202020204" pitchFamily="34" charset="0"/>
+              <a:buChar char="•"/>
+            </a:pPr>
+            <a:r>
+              <a:rPr lang="pt-BR" sz="1600" dirty="0">
+                <a:solidFill>
+                  <a:schemeClr val="tx1">
+                    <a:lumMod val="75000"/>
+                    <a:lumOff val="25000"/>
+                  </a:schemeClr>
+                </a:solidFill>
+              </a:rPr>
+              <a:t>Correlação entre atributos  macroeconômicos</a:t>
+            </a:r>
+          </a:p>
+        </p:txBody>
+      </p:sp>
+    </p:spTree>
+    <p:extLst>
+      <p:ext uri="{BB962C8B-B14F-4D97-AF65-F5344CB8AC3E}">
+        <p14:creationId xmlns:p14="http://schemas.microsoft.com/office/powerpoint/2010/main" val="3686980716"/>
+      </p:ext>
+    </p:extLst>
+  </p:cSld>
+  <p:clrMapOvr>
+    <a:masterClrMapping/>
+  </p:clrMapOvr>
+</p:sld>
+</file>
+
+<file path=ppt/slides/slide9.xml><?xml version="1.0" encoding="utf-8"?>
+<p:sld xmlns:a="http://schemas.openxmlformats.org/drawingml/2006/main" xmlns:r="http://schemas.openxmlformats.org/officeDocument/2006/relationships" xmlns:p="http://schemas.openxmlformats.org/presentationml/2006/main">
+  <p:cSld>
+    <p:spTree>
+      <p:nvGrpSpPr>
+        <p:cNvPr id="1" name=""/>
+        <p:cNvGrpSpPr/>
+        <p:nvPr/>
+      </p:nvGrpSpPr>
+      <p:grpSpPr>
+        <a:xfrm>
+          <a:off x="0" y="0"/>
+          <a:ext cx="0" cy="0"/>
+          <a:chOff x="0" y="0"/>
+          <a:chExt cx="0" cy="0"/>
+        </a:xfrm>
+      </p:grpSpPr>
+      <p:sp>
+        <p:nvSpPr>
+          <p:cNvPr id="2" name="Espaço Reservado para Texto 1">
+            <a:extLst>
+              <a:ext uri="{FF2B5EF4-FFF2-40B4-BE49-F238E27FC236}">
+                <a16:creationId xmlns:a16="http://schemas.microsoft.com/office/drawing/2014/main" id="{2735EEA7-6508-3C41-1176-C7012D716092}"/>
+              </a:ext>
+            </a:extLst>
+          </p:cNvPr>
+          <p:cNvSpPr txBox="1">
+            <a:spLocks/>
+          </p:cNvSpPr>
+          <p:nvPr/>
+        </p:nvSpPr>
+        <p:spPr>
+          <a:xfrm>
+            <a:off x="542866" y="340389"/>
+            <a:ext cx="6195285" cy="721222"/>
+          </a:xfrm>
+          <a:prstGeom prst="rect">
+            <a:avLst/>
+          </a:prstGeom>
+        </p:spPr>
+        <p:txBody>
+          <a:bodyPr vert="horz" lIns="91440" tIns="45720" rIns="91440" bIns="45720" rtlCol="0" anchor="ctr"/>
+          <a:lstStyle>
+            <a:defPPr rtl="0">
+              <a:defRPr lang="pt-br"/>
+            </a:defPPr>
+            <a:lvl1pPr marL="0" algn="l" defTabSz="914400" rtl="0" eaLnBrk="1" latinLnBrk="0" hangingPunct="1">
+              <a:defRPr sz="800" kern="1200">
+                <a:solidFill>
+                  <a:srgbClr val="FFFFFF"/>
+                </a:solidFill>
+                <a:latin typeface="+mn-lt"/>
+                <a:ea typeface="+mn-ea"/>
+                <a:cs typeface="+mn-cs"/>
+              </a:defRPr>
+            </a:lvl1pPr>
+            <a:lvl2pPr marL="457200" algn="l" defTabSz="914400" rtl="0" eaLnBrk="1" latinLnBrk="0" hangingPunct="1">
+              <a:defRPr sz="1800" kern="1200">
+                <a:solidFill>
+                  <a:schemeClr val="tx1"/>
+                </a:solidFill>
+                <a:latin typeface="+mn-lt"/>
+                <a:ea typeface="+mn-ea"/>
+                <a:cs typeface="+mn-cs"/>
+              </a:defRPr>
+            </a:lvl2pPr>
+            <a:lvl3pPr marL="914400" algn="l" defTabSz="914400" rtl="0" eaLnBrk="1" latinLnBrk="0" hangingPunct="1">
+              <a:defRPr sz="1800" kern="1200">
+                <a:solidFill>
+                  <a:schemeClr val="tx1"/>
+                </a:solidFill>
+                <a:latin typeface="+mn-lt"/>
+                <a:ea typeface="+mn-ea"/>
+                <a:cs typeface="+mn-cs"/>
+              </a:defRPr>
+            </a:lvl3pPr>
+            <a:lvl4pPr marL="1371600" algn="l" defTabSz="914400" rtl="0" eaLnBrk="1" latinLnBrk="0" hangingPunct="1">
+              <a:defRPr sz="1800" kern="1200">
+                <a:solidFill>
+                  <a:schemeClr val="tx1"/>
+                </a:solidFill>
+                <a:latin typeface="+mn-lt"/>
+                <a:ea typeface="+mn-ea"/>
+                <a:cs typeface="+mn-cs"/>
+              </a:defRPr>
+            </a:lvl4pPr>
+            <a:lvl5pPr marL="1828800" algn="l" defTabSz="914400" rtl="0" eaLnBrk="1" latinLnBrk="0" hangingPunct="1">
+              <a:defRPr sz="1800" kern="1200">
+                <a:solidFill>
+                  <a:schemeClr val="tx1"/>
+                </a:solidFill>
+                <a:latin typeface="+mn-lt"/>
+                <a:ea typeface="+mn-ea"/>
+                <a:cs typeface="+mn-cs"/>
+              </a:defRPr>
+            </a:lvl5pPr>
+            <a:lvl6pPr marL="2286000" algn="l" defTabSz="914400" rtl="0" eaLnBrk="1" latinLnBrk="0" hangingPunct="1">
+              <a:defRPr sz="1800" kern="1200">
+                <a:solidFill>
+                  <a:schemeClr val="tx1"/>
+                </a:solidFill>
+                <a:latin typeface="+mn-lt"/>
+                <a:ea typeface="+mn-ea"/>
+                <a:cs typeface="+mn-cs"/>
+              </a:defRPr>
+            </a:lvl6pPr>
+            <a:lvl7pPr marL="2743200" algn="l" defTabSz="914400" rtl="0" eaLnBrk="1" latinLnBrk="0" hangingPunct="1">
+              <a:defRPr sz="1800" kern="1200">
+                <a:solidFill>
+                  <a:schemeClr val="tx1"/>
+                </a:solidFill>
+                <a:latin typeface="+mn-lt"/>
+                <a:ea typeface="+mn-ea"/>
+                <a:cs typeface="+mn-cs"/>
+              </a:defRPr>
+            </a:lvl7pPr>
+            <a:lvl8pPr marL="3200400" algn="l" defTabSz="914400" rtl="0" eaLnBrk="1" latinLnBrk="0" hangingPunct="1">
+              <a:defRPr sz="1800" kern="1200">
+                <a:solidFill>
+                  <a:schemeClr val="tx1"/>
+                </a:solidFill>
+                <a:latin typeface="+mn-lt"/>
+                <a:ea typeface="+mn-ea"/>
+                <a:cs typeface="+mn-cs"/>
+              </a:defRPr>
+            </a:lvl8pPr>
+            <a:lvl9pPr marL="3657600" algn="l" defTabSz="914400" rtl="0" eaLnBrk="1" latinLnBrk="0" hangingPunct="1">
+              <a:defRPr sz="1800" kern="1200">
+                <a:solidFill>
+                  <a:schemeClr val="tx1"/>
+                </a:solidFill>
+                <a:latin typeface="+mn-lt"/>
+                <a:ea typeface="+mn-ea"/>
+                <a:cs typeface="+mn-cs"/>
+              </a:defRPr>
+            </a:lvl9pPr>
+          </a:lstStyle>
+          <a:p>
+            <a:endParaRPr lang="en-US" sz="4700" spc="-50" dirty="0">
+              <a:solidFill>
+                <a:schemeClr val="tx1">
+                  <a:lumMod val="75000"/>
+                  <a:lumOff val="25000"/>
+                </a:schemeClr>
+              </a:solidFill>
+              <a:latin typeface="+mj-lt"/>
+              <a:ea typeface="+mj-ea"/>
+              <a:cs typeface="+mj-cs"/>
+            </a:endParaRPr>
+          </a:p>
+        </p:txBody>
+      </p:sp>
+      <p:sp>
+        <p:nvSpPr>
+          <p:cNvPr id="5" name="Título 1">
+            <a:extLst>
+              <a:ext uri="{FF2B5EF4-FFF2-40B4-BE49-F238E27FC236}">
+                <a16:creationId xmlns:a16="http://schemas.microsoft.com/office/drawing/2014/main" id="{9BA25DD3-8952-F6D4-2708-391E2D8E8720}"/>
+              </a:ext>
+            </a:extLst>
+          </p:cNvPr>
+          <p:cNvSpPr txBox="1">
+            <a:spLocks/>
+          </p:cNvSpPr>
+          <p:nvPr/>
+        </p:nvSpPr>
+        <p:spPr>
+          <a:xfrm>
+            <a:off x="411271" y="292197"/>
+            <a:ext cx="6172064" cy="968375"/>
+          </a:xfrm>
+          <a:prstGeom prst="rect">
+            <a:avLst/>
+          </a:prstGeom>
+        </p:spPr>
+        <p:txBody>
+          <a:bodyPr/>
+          <a:lstStyle>
+            <a:lvl1pPr algn="l" defTabSz="914400" rtl="0" eaLnBrk="1" latinLnBrk="0" hangingPunct="1">
+              <a:lnSpc>
+                <a:spcPct val="90000"/>
+              </a:lnSpc>
+              <a:spcBef>
+                <a:spcPct val="0"/>
+              </a:spcBef>
+              <a:buNone/>
+              <a:defRPr sz="4700" i="0" kern="1200" spc="-50" baseline="0">
+                <a:solidFill>
+                  <a:schemeClr val="tx1">
+                    <a:lumMod val="75000"/>
+                    <a:lumOff val="25000"/>
+                  </a:schemeClr>
+                </a:solidFill>
+                <a:latin typeface="+mj-lt"/>
+                <a:ea typeface="+mj-ea"/>
+                <a:cs typeface="+mj-cs"/>
+              </a:defRPr>
+            </a:lvl1pPr>
+          </a:lstStyle>
+          <a:p>
+            <a:r>
+              <a:rPr lang="en-US" sz="4700" spc="-50" dirty="0" err="1">
+                <a:solidFill>
+                  <a:schemeClr val="tx1">
+                    <a:lumMod val="75000"/>
+                    <a:lumOff val="25000"/>
+                  </a:schemeClr>
+                </a:solidFill>
+                <a:latin typeface="+mj-lt"/>
+                <a:ea typeface="+mj-ea"/>
+                <a:cs typeface="+mj-cs"/>
+              </a:rPr>
+              <a:t>Análise</a:t>
+            </a:r>
+            <a:r>
+              <a:rPr lang="en-US" sz="4700" spc="-50" dirty="0">
+                <a:solidFill>
+                  <a:schemeClr val="tx1">
+                    <a:lumMod val="75000"/>
+                    <a:lumOff val="25000"/>
+                  </a:schemeClr>
+                </a:solidFill>
+                <a:latin typeface="+mj-lt"/>
+                <a:ea typeface="+mj-ea"/>
+                <a:cs typeface="+mj-cs"/>
+              </a:rPr>
+              <a:t> </a:t>
+            </a:r>
+            <a:r>
+              <a:rPr lang="en-US" sz="4700" spc="-50" dirty="0" err="1">
+                <a:solidFill>
+                  <a:schemeClr val="tx1">
+                    <a:lumMod val="75000"/>
+                    <a:lumOff val="25000"/>
+                  </a:schemeClr>
+                </a:solidFill>
+                <a:latin typeface="+mj-lt"/>
+                <a:ea typeface="+mj-ea"/>
+                <a:cs typeface="+mj-cs"/>
+              </a:rPr>
+              <a:t>Exploratória</a:t>
+            </a:r>
+            <a:endParaRPr lang="en-US" sz="4700" spc="-50" dirty="0">
+              <a:solidFill>
+                <a:schemeClr val="tx1">
+                  <a:lumMod val="75000"/>
+                  <a:lumOff val="25000"/>
+                </a:schemeClr>
+              </a:solidFill>
+              <a:latin typeface="+mj-lt"/>
+              <a:ea typeface="+mj-ea"/>
+              <a:cs typeface="+mj-cs"/>
+            </a:endParaRPr>
+          </a:p>
+        </p:txBody>
+      </p:sp>
+      <p:sp>
+        <p:nvSpPr>
+          <p:cNvPr id="6" name="CaixaDeTexto 5">
+            <a:extLst>
+              <a:ext uri="{FF2B5EF4-FFF2-40B4-BE49-F238E27FC236}">
+                <a16:creationId xmlns:a16="http://schemas.microsoft.com/office/drawing/2014/main" id="{D2738E02-8EC1-F32D-B04E-FE7481960072}"/>
+              </a:ext>
+            </a:extLst>
+          </p:cNvPr>
+          <p:cNvSpPr txBox="1"/>
+          <p:nvPr/>
+        </p:nvSpPr>
+        <p:spPr>
+          <a:xfrm>
+            <a:off x="542866" y="1109803"/>
+            <a:ext cx="7207340" cy="338554"/>
+          </a:xfrm>
+          <a:prstGeom prst="rect">
+            <a:avLst/>
+          </a:prstGeom>
+          <a:noFill/>
+        </p:spPr>
+        <p:txBody>
+          <a:bodyPr wrap="square" rtlCol="0">
+            <a:spAutoFit/>
+          </a:bodyPr>
+          <a:lstStyle/>
+          <a:p>
+            <a:pPr marL="285750" indent="-285750">
+              <a:buFont typeface="Arial" panose="020B0604020202020204" pitchFamily="34" charset="0"/>
+              <a:buChar char="•"/>
+            </a:pPr>
+            <a:r>
+              <a:rPr lang="pt-BR" sz="1600" dirty="0">
+                <a:solidFill>
+                  <a:schemeClr val="tx1">
+                    <a:lumMod val="75000"/>
+                    <a:lumOff val="25000"/>
+                  </a:schemeClr>
+                </a:solidFill>
+              </a:rPr>
+              <a:t>Combinação de atributos</a:t>
+            </a:r>
+          </a:p>
+        </p:txBody>
+      </p:sp>
+      <p:pic>
+        <p:nvPicPr>
+          <p:cNvPr id="7" name="Imagem 6" descr="Tabela&#10;&#10;Descrição gerada automaticamente com confiança média">
+            <a:extLst>
+              <a:ext uri="{FF2B5EF4-FFF2-40B4-BE49-F238E27FC236}">
+                <a16:creationId xmlns:a16="http://schemas.microsoft.com/office/drawing/2014/main" id="{6EC2C9A4-89DD-76AE-0FBD-252E30C26AC2}"/>
+              </a:ext>
+            </a:extLst>
+          </p:cNvPr>
+          <p:cNvPicPr>
+            <a:picLocks noChangeAspect="1"/>
+          </p:cNvPicPr>
+          <p:nvPr/>
+        </p:nvPicPr>
+        <p:blipFill>
+          <a:blip r:embed="rId2"/>
+          <a:stretch>
+            <a:fillRect/>
+          </a:stretch>
+        </p:blipFill>
+        <p:spPr>
+          <a:xfrm>
+            <a:off x="266529" y="1846943"/>
+            <a:ext cx="11492883" cy="3901254"/>
+          </a:xfrm>
+          <a:prstGeom prst="rect">
+            <a:avLst/>
+          </a:prstGeom>
+        </p:spPr>
+      </p:pic>
+    </p:spTree>
+    <p:extLst>
+      <p:ext uri="{BB962C8B-B14F-4D97-AF65-F5344CB8AC3E}">
+        <p14:creationId xmlns:p14="http://schemas.microsoft.com/office/powerpoint/2010/main" val="2138060610"/>
       </p:ext>
     </p:extLst>
   </p:cSld>
@@ -13419,15 +14081,6 @@
 </file>
 
 <file path=customXml/item1.xml><?xml version="1.0" encoding="utf-8"?>
-<?mso-contentType ?>
-<FormTemplates xmlns="http://schemas.microsoft.com/sharepoint/v3/contenttype/forms">
-  <Display>DocumentLibraryForm</Display>
-  <Edit>DocumentLibraryForm</Edit>
-  <New>DocumentLibraryForm</New>
-</FormTemplates>
-</file>
-
-<file path=customXml/item2.xml><?xml version="1.0" encoding="utf-8"?>
 <ct:contentTypeSchema xmlns:ct="http://schemas.microsoft.com/office/2006/metadata/contentType" xmlns:ma="http://schemas.microsoft.com/office/2006/metadata/properties/metaAttributes" ct:_="" ma:_="" ma:contentTypeName="Document" ma:contentTypeID="0x01010079F111ED35F8CC479449609E8A0923A6" ma:contentTypeVersion="12" ma:contentTypeDescription="Create a new document." ma:contentTypeScope="" ma:versionID="a410dd7f93c95333ffa1b60ed6adedd1">
   <xsd:schema xmlns:xsd="http://www.w3.org/2001/XMLSchema" xmlns:xs="http://www.w3.org/2001/XMLSchema" xmlns:p="http://schemas.microsoft.com/office/2006/metadata/properties" xmlns:ns2="71af3243-3dd4-4a8d-8c0d-dd76da1f02a5" xmlns:ns3="16c05727-aa75-4e4a-9b5f-8a80a1165891" targetNamespace="http://schemas.microsoft.com/office/2006/metadata/properties" ma:root="true" ma:fieldsID="a936d9baba76aa3866493feff160faab" ns2:_="" ns3:_="">
     <xsd:import namespace="71af3243-3dd4-4a8d-8c0d-dd76da1f02a5"/>
@@ -13648,6 +14301,15 @@
 </ct:contentTypeSchema>
 </file>
 
+<file path=customXml/item2.xml><?xml version="1.0" encoding="utf-8"?>
+<?mso-contentType ?>
+<FormTemplates xmlns="http://schemas.microsoft.com/sharepoint/v3/contenttype/forms">
+  <Display>DocumentLibraryForm</Display>
+  <Edit>DocumentLibraryForm</Edit>
+  <New>DocumentLibraryForm</New>
+</FormTemplates>
+</file>
+
 <file path=customXml/item3.xml><?xml version="1.0" encoding="utf-8"?>
 <p:properties xmlns:p="http://schemas.microsoft.com/office/2006/metadata/properties" xmlns:xsi="http://www.w3.org/2001/XMLSchema-instance" xmlns:pc="http://schemas.microsoft.com/office/infopath/2007/PartnerControls">
   <documentManagement>
@@ -13658,14 +14320,6 @@
 </file>
 
 <file path=customXml/itemProps1.xml><?xml version="1.0" encoding="utf-8"?>
-<ds:datastoreItem xmlns:ds="http://schemas.openxmlformats.org/officeDocument/2006/customXml" ds:itemID="{AA3F7EDC-E5B4-4BBC-9D2A-CBE6D46C37AD}">
-  <ds:schemaRefs>
-    <ds:schemaRef ds:uri="http://schemas.microsoft.com/sharepoint/v3/contenttype/forms"/>
-  </ds:schemaRefs>
-</ds:datastoreItem>
-</file>
-
-<file path=customXml/itemProps2.xml><?xml version="1.0" encoding="utf-8"?>
 <ds:datastoreItem xmlns:ds="http://schemas.openxmlformats.org/officeDocument/2006/customXml" ds:itemID="{93932EF5-314F-409E-8020-FEE5FA0795B9}">
   <ds:schemaRefs>
     <ds:schemaRef ds:uri="http://schemas.microsoft.com/office/2006/metadata/contentType"/>
@@ -13684,6 +14338,14 @@
 </ds:datastoreItem>
 </file>
 
+<file path=customXml/itemProps2.xml><?xml version="1.0" encoding="utf-8"?>
+<ds:datastoreItem xmlns:ds="http://schemas.openxmlformats.org/officeDocument/2006/customXml" ds:itemID="{AA3F7EDC-E5B4-4BBC-9D2A-CBE6D46C37AD}">
+  <ds:schemaRefs>
+    <ds:schemaRef ds:uri="http://schemas.microsoft.com/sharepoint/v3/contenttype/forms"/>
+  </ds:schemaRefs>
+</ds:datastoreItem>
+</file>
+
 <file path=customXml/itemProps3.xml><?xml version="1.0" encoding="utf-8"?>
 <ds:datastoreItem xmlns:ds="http://schemas.openxmlformats.org/officeDocument/2006/customXml" ds:itemID="{A03EEFF0-FB57-4CB4-8BFC-DF397689E2ED}">
   <ds:schemaRefs>

</xml_diff>